<commit_message>
feat(interview-leitfaden): correct content + files
</commit_message>
<xml_diff>
--- a/public/documents/interview-leitfaden/Zielgruppenanaylse-Buergercheck.pptx
+++ b/public/documents/interview-leitfaden/Zielgruppenanaylse-Buergercheck.pptx
@@ -271,7 +271,7 @@
       </p15:sldGuideLst>
     </p:ext>
     <p:ext uri="GoogleSlidesCustomDataVersion2">
-      <go:slidesCustomData xmlns:go="http://customooxmlschemas.google.com/" r:id="rId11" roundtripDataSignature="AMtx7miFq0EOv3srfCFW6zCDlK5UuHrltg=="/>
+      <go:slidesCustomData xmlns:go="http://customooxmlschemas.google.com/" r:id="rId11" roundtripDataSignature="AMtx7mjXRo+r+gQMYzyIXmOpdduWHXQt+g=="/>
     </p:ext>
   </p:extLst>
 </p:presentation>
@@ -2882,7 +2882,7 @@
       </p:pic>
       <p:pic>
         <p:nvPicPr>
-          <p:cNvPr id="20" name="Google Shape;20;p21"/>
+          <p:cNvPr id="20" name="Google Shape;20;p21" title="BMDS LOGO.png"/>
           <p:cNvPicPr preferRelativeResize="0"/>
           <p:nvPr/>
         </p:nvPicPr>
@@ -2890,13 +2890,13 @@
           <a:blip r:embed="rId3">
             <a:alphaModFix/>
           </a:blip>
-          <a:srcRect b="0" l="0" r="0" t="0"/>
+          <a:srcRect b="0" l="4128" r="4128" t="0"/>
           <a:stretch/>
         </p:blipFill>
         <p:spPr>
           <a:xfrm>
             <a:off x="4829581" y="377933"/>
-            <a:ext cx="1759765" cy="1115949"/>
+            <a:ext cx="1759765" cy="1115948"/>
           </a:xfrm>
           <a:prstGeom prst="rect">
             <a:avLst/>
@@ -27278,8 +27278,8 @@
         </p:nvSpPr>
         <p:spPr>
           <a:xfrm>
-            <a:off x="5392613" y="3756702"/>
-            <a:ext cx="6799387" cy="2400657"/>
+            <a:off x="5392613" y="3872206"/>
+            <a:ext cx="6075600" cy="2678400"/>
           </a:xfrm>
           <a:prstGeom prst="rect">
             <a:avLst/>
@@ -27350,8 +27350,8 @@
         </p:nvSpPr>
         <p:spPr>
           <a:xfrm>
-            <a:off x="3173608" y="11430"/>
-            <a:ext cx="1802412" cy="6857999"/>
+            <a:off x="3031337" y="0"/>
+            <a:ext cx="1802400" cy="6858000"/>
           </a:xfrm>
           <a:prstGeom prst="rect">
             <a:avLst/>
@@ -27443,7 +27443,27 @@
                 <a:cs typeface="Arial"/>
                 <a:sym typeface="Arial"/>
               </a:rPr>
-              <a:t>Referat 612 – Verhaltenswissenschaften und bürgerzentrierte Politik</a:t>
+              <a:t>Referat </a:t>
+            </a:r>
+            <a:r>
+              <a:rPr lang="de-DE">
+                <a:solidFill>
+                  <a:schemeClr val="accent3"/>
+                </a:solidFill>
+              </a:rPr>
+              <a:t>SB II 4, </a:t>
+            </a:r>
+            <a:r>
+              <a:rPr b="0" i="0" lang="de-DE" sz="1400" u="none" cap="none" strike="noStrike">
+                <a:solidFill>
+                  <a:schemeClr val="accent3"/>
+                </a:solidFill>
+                <a:latin typeface="Arial"/>
+                <a:ea typeface="Arial"/>
+                <a:cs typeface="Arial"/>
+                <a:sym typeface="Arial"/>
+              </a:rPr>
+              <a:t>Verhaltenswissenschaften und bürgerzentrierte Politik</a:t>
             </a:r>
             <a:endParaRPr b="0" i="0" sz="1400" u="none" cap="none" strike="noStrike">
               <a:solidFill>
@@ -27474,8 +27494,8 @@
         </p:blipFill>
         <p:spPr>
           <a:xfrm>
-            <a:off x="-173255" y="1805"/>
-            <a:ext cx="4983875" cy="7080900"/>
+            <a:off x="2592" y="0"/>
+            <a:ext cx="4826986" cy="6858001"/>
           </a:xfrm>
           <a:prstGeom prst="rect">
             <a:avLst/>
@@ -27820,7 +27840,8 @@
               <a:buNone/>
             </a:pPr>
             <a:r>
-              <a:t/>
+              <a:rPr lang="de-DE"/>
+              <a:t>(aus der Bürgerinnen und Bürger Perspektive)</a:t>
             </a:r>
             <a:endParaRPr/>
           </a:p>
@@ -34998,7 +35019,7 @@
         </p:nvSpPr>
         <p:spPr>
           <a:xfrm>
-            <a:off x="3459645" y="2400467"/>
+            <a:off x="5152508" y="2394867"/>
             <a:ext cx="898200" cy="550500"/>
           </a:xfrm>
           <a:prstGeom prst="ellipse">
@@ -35062,7 +35083,7 @@
         <p:spPr>
           <a:xfrm>
             <a:off x="723802" y="6356028"/>
-            <a:ext cx="4065000" cy="431100"/>
+            <a:ext cx="4065000" cy="200100"/>
           </a:xfrm>
           <a:prstGeom prst="rect">
             <a:avLst/>
@@ -35096,7 +35117,7 @@
               <a:buNone/>
             </a:pPr>
             <a:r>
-              <a:rPr b="0" i="0" lang="de-DE" sz="1400" u="none" cap="none" strike="noStrike">
+              <a:rPr b="0" i="0" lang="de-DE" sz="1300" u="none" cap="none" strike="noStrike">
                 <a:solidFill>
                   <a:schemeClr val="dk1"/>
                 </a:solidFill>
@@ -35107,7 +35128,7 @@
               </a:rPr>
               <a:t>Ausschnitt – weitere betroffene Zielgruppen ergänzen</a:t>
             </a:r>
-            <a:endParaRPr b="0" i="0" sz="1400" u="none" cap="none" strike="noStrike">
+            <a:endParaRPr b="0" i="0" sz="1300" u="none" cap="none" strike="noStrike">
               <a:solidFill>
                 <a:srgbClr val="000000"/>
               </a:solidFill>
@@ -35222,27 +35243,27 @@
           <a:p>
             <a:pPr indent="0" lvl="0" marL="0" rtl="0" algn="l">
               <a:lnSpc>
-                <a:spcPct val="100000"/>
-              </a:lnSpc>
-              <a:spcBef>
-                <a:spcPts val="0"/>
-              </a:spcBef>
-              <a:spcAft>
-                <a:spcPts val="0"/>
-              </a:spcAft>
-              <a:buSzPct val="32142"/>
+                <a:spcPct val="115000"/>
+              </a:lnSpc>
+              <a:spcBef>
+                <a:spcPts val="0"/>
+              </a:spcBef>
+              <a:spcAft>
+                <a:spcPts val="0"/>
+              </a:spcAft>
+              <a:buSzPct val="34615"/>
               <a:buNone/>
             </a:pPr>
             <a:r>
-              <a:rPr b="1" lang="de-DE" sz="5600"/>
+              <a:rPr b="1" lang="de-DE" sz="5200"/>
               <a:t>Fortbildungsangebote </a:t>
             </a:r>
-            <a:endParaRPr sz="5600"/>
+            <a:endParaRPr sz="5200"/>
           </a:p>
           <a:p>
-            <a:pPr indent="-169545" lvl="1" marL="357187" rtl="0" algn="l">
-              <a:lnSpc>
-                <a:spcPct val="100000"/>
+            <a:pPr indent="-163195" lvl="1" marL="357187" rtl="0" algn="l">
+              <a:lnSpc>
+                <a:spcPct val="115000"/>
               </a:lnSpc>
               <a:spcBef>
                 <a:spcPts val="600"/>
@@ -35254,19 +35275,19 @@
               <a:buChar char="•"/>
             </a:pPr>
             <a:r>
-              <a:rPr lang="de-DE" sz="5600" u="sng"/>
+              <a:rPr lang="de-DE" sz="5200" u="sng"/>
               <a:t>Verstehen, Entwickeln, Testen </a:t>
             </a:r>
             <a:r>
-              <a:rPr lang="de-DE" sz="5600"/>
+              <a:rPr lang="de-DE" sz="5200"/>
               <a:t>(für Fachebene der Ressorts)</a:t>
             </a:r>
-            <a:endParaRPr sz="5600" u="sng"/>
+            <a:endParaRPr sz="5200" u="sng"/>
           </a:p>
           <a:p>
-            <a:pPr indent="-169545" lvl="1" marL="357187" rtl="0" algn="l">
-              <a:lnSpc>
-                <a:spcPct val="100000"/>
+            <a:pPr indent="-163195" lvl="1" marL="357187" rtl="0" algn="l">
+              <a:lnSpc>
+                <a:spcPct val="115000"/>
               </a:lnSpc>
               <a:spcBef>
                 <a:spcPts val="600"/>
@@ -35278,19 +35299,19 @@
               <a:buChar char="•"/>
             </a:pPr>
             <a:r>
-              <a:rPr lang="de-DE" sz="5600" u="sng"/>
+              <a:rPr lang="de-DE" sz="5200" u="sng"/>
               <a:t>Bürgerzentrierte, agile Gesetzgebung</a:t>
             </a:r>
             <a:r>
-              <a:rPr lang="de-DE" sz="5600"/>
+              <a:rPr lang="de-DE" sz="5200"/>
               <a:t> (für agile Coaches)</a:t>
             </a:r>
-            <a:endParaRPr sz="5600"/>
+            <a:endParaRPr sz="5200"/>
           </a:p>
           <a:p>
             <a:pPr indent="-80645" lvl="1" marL="357187" rtl="0" algn="l">
               <a:lnSpc>
-                <a:spcPct val="100000"/>
+                <a:spcPct val="115000"/>
               </a:lnSpc>
               <a:spcBef>
                 <a:spcPts val="600"/>
@@ -35298,18 +35319,18 @@
               <a:spcAft>
                 <a:spcPts val="0"/>
               </a:spcAft>
-              <a:buSzPct val="32142"/>
+              <a:buSzPct val="34615"/>
               <a:buNone/>
             </a:pPr>
             <a:r>
               <a:t/>
             </a:r>
-            <a:endParaRPr b="1" sz="5600"/>
+            <a:endParaRPr b="1" sz="5200"/>
           </a:p>
           <a:p>
             <a:pPr indent="0" lvl="0" marL="0" rtl="0" algn="l">
               <a:lnSpc>
-                <a:spcPct val="100000"/>
+                <a:spcPct val="115000"/>
               </a:lnSpc>
               <a:spcBef>
                 <a:spcPts val="600"/>
@@ -35317,19 +35338,19 @@
               <a:spcAft>
                 <a:spcPts val="0"/>
               </a:spcAft>
-              <a:buSzPct val="32142"/>
+              <a:buSzPct val="34615"/>
               <a:buNone/>
             </a:pPr>
             <a:r>
-              <a:rPr b="1" lang="de-DE" sz="5600"/>
+              <a:rPr b="1" lang="de-DE" sz="5200"/>
               <a:t>Unterstützung bei der Anwendung der Methoden </a:t>
             </a:r>
-            <a:endParaRPr sz="5600"/>
+            <a:endParaRPr sz="5200"/>
           </a:p>
           <a:p>
-            <a:pPr indent="-169545" lvl="1" marL="357187" rtl="0" algn="l">
-              <a:lnSpc>
-                <a:spcPct val="100000"/>
+            <a:pPr indent="-163195" lvl="1" marL="357187" rtl="0" algn="l">
+              <a:lnSpc>
+                <a:spcPct val="115000"/>
               </a:lnSpc>
               <a:spcBef>
                 <a:spcPts val="600"/>
@@ -35341,15 +35362,15 @@
               <a:buChar char="•"/>
             </a:pPr>
             <a:r>
-              <a:rPr lang="de-DE" sz="5600" u="sng"/>
+              <a:rPr lang="de-DE" sz="5200" u="sng"/>
               <a:t>Leuchtturmprojekte </a:t>
             </a:r>
-            <a:endParaRPr sz="5600"/>
+            <a:endParaRPr sz="5200"/>
           </a:p>
           <a:p>
-            <a:pPr indent="-169545" lvl="1" marL="357187" rtl="0" algn="l">
-              <a:lnSpc>
-                <a:spcPct val="100000"/>
+            <a:pPr indent="-163195" lvl="1" marL="357187" rtl="0" algn="l">
+              <a:lnSpc>
+                <a:spcPct val="115000"/>
               </a:lnSpc>
               <a:spcBef>
                 <a:spcPts val="600"/>
@@ -35361,19 +35382,19 @@
               <a:buChar char="•"/>
             </a:pPr>
             <a:r>
-              <a:rPr lang="de-DE" sz="5600" u="sng"/>
+              <a:rPr lang="de-DE" sz="5200" u="sng"/>
               <a:t>Bürgercheck </a:t>
             </a:r>
             <a:r>
-              <a:rPr lang="de-DE" sz="5600"/>
+              <a:rPr lang="de-DE" sz="5200"/>
               <a:t>Workshops für Ihre Fachebene: wir arbeiten gemeinsam mit einem der 5 Tools an einem aktuellen Vorhaben aus Ihrem Bereich</a:t>
             </a:r>
-            <a:endParaRPr sz="5600"/>
+            <a:endParaRPr sz="5200"/>
           </a:p>
           <a:p>
-            <a:pPr indent="-169545" lvl="1" marL="357187" rtl="0" algn="l">
-              <a:lnSpc>
-                <a:spcPct val="100000"/>
+            <a:pPr indent="-163195" lvl="1" marL="357187" rtl="0" algn="l">
+              <a:lnSpc>
+                <a:spcPct val="115000"/>
               </a:lnSpc>
               <a:spcBef>
                 <a:spcPts val="600"/>
@@ -35385,15 +35406,15 @@
               <a:buChar char="•"/>
             </a:pPr>
             <a:r>
-              <a:rPr lang="de-DE" sz="5600" u="sng"/>
+              <a:rPr lang="de-DE" sz="5200" u="sng"/>
               <a:t>Schulterblick</a:t>
             </a:r>
-            <a:endParaRPr sz="5600"/>
+            <a:endParaRPr sz="5200"/>
           </a:p>
           <a:p>
-            <a:pPr indent="-169545" lvl="1" marL="357187" rtl="0" algn="l">
-              <a:lnSpc>
-                <a:spcPct val="100000"/>
+            <a:pPr indent="-163195" lvl="1" marL="357187" rtl="0" algn="l">
+              <a:lnSpc>
+                <a:spcPct val="115000"/>
               </a:lnSpc>
               <a:spcBef>
                 <a:spcPts val="600"/>
@@ -35405,19 +35426,19 @@
               <a:buChar char="•"/>
             </a:pPr>
             <a:r>
-              <a:rPr lang="de-DE" sz="5600" u="sng"/>
+              <a:rPr lang="de-DE" sz="5200" u="sng"/>
               <a:t>Vorbereitung von Ausschreibungen </a:t>
             </a:r>
             <a:r>
-              <a:rPr lang="de-DE" sz="5600"/>
+              <a:rPr lang="de-DE" sz="5200"/>
               <a:t>(z.B. Insight Studien, Prototypentests)</a:t>
             </a:r>
-            <a:endParaRPr sz="5600" u="sng"/>
+            <a:endParaRPr sz="5200" u="sng"/>
           </a:p>
           <a:p>
             <a:pPr indent="0" lvl="0" marL="0" rtl="0" algn="l">
               <a:lnSpc>
-                <a:spcPct val="100000"/>
+                <a:spcPct val="115000"/>
               </a:lnSpc>
               <a:spcBef>
                 <a:spcPts val="600"/>
@@ -35425,18 +35446,18 @@
               <a:spcAft>
                 <a:spcPts val="0"/>
               </a:spcAft>
-              <a:buSzPct val="32142"/>
+              <a:buSzPct val="34615"/>
               <a:buNone/>
             </a:pPr>
             <a:r>
               <a:t/>
             </a:r>
-            <a:endParaRPr b="1" sz="5600"/>
+            <a:endParaRPr b="1" sz="5200"/>
           </a:p>
           <a:p>
             <a:pPr indent="0" lvl="0" marL="0" rtl="0" algn="l">
               <a:lnSpc>
-                <a:spcPct val="100000"/>
+                <a:spcPct val="115000"/>
               </a:lnSpc>
               <a:spcBef>
                 <a:spcPts val="600"/>
@@ -35444,19 +35465,19 @@
               <a:spcAft>
                 <a:spcPts val="0"/>
               </a:spcAft>
-              <a:buSzPct val="32142"/>
+              <a:buSzPct val="34615"/>
               <a:buNone/>
             </a:pPr>
             <a:r>
-              <a:rPr b="1" lang="de-DE" sz="5600"/>
+              <a:rPr b="1" lang="de-DE" sz="5200"/>
               <a:t>Ressortaustausch und Vernetzung</a:t>
             </a:r>
-            <a:endParaRPr sz="5600"/>
+            <a:endParaRPr sz="5200"/>
           </a:p>
           <a:p>
-            <a:pPr indent="-169545" lvl="1" marL="357187" rtl="0" algn="l">
-              <a:lnSpc>
-                <a:spcPct val="100000"/>
+            <a:pPr indent="-163195" lvl="1" marL="357187" rtl="0" algn="l">
+              <a:lnSpc>
+                <a:spcPct val="115000"/>
               </a:lnSpc>
               <a:spcBef>
                 <a:spcPts val="600"/>
@@ -35468,19 +35489,19 @@
               <a:buChar char="•"/>
             </a:pPr>
             <a:r>
-              <a:rPr lang="de-DE" sz="5600" u="sng"/>
+              <a:rPr lang="de-DE" sz="5200" u="sng"/>
               <a:t>Ressortkreis</a:t>
             </a:r>
             <a:r>
-              <a:rPr lang="de-DE" sz="5600"/>
+              <a:rPr lang="de-DE" sz="5200"/>
               <a:t> „Bürgerzentrierte Politikgestaltung“</a:t>
             </a:r>
-            <a:endParaRPr sz="5600"/>
+            <a:endParaRPr sz="5200"/>
           </a:p>
           <a:p>
-            <a:pPr indent="-169545" lvl="1" marL="357187" rtl="0" algn="l">
-              <a:lnSpc>
-                <a:spcPct val="100000"/>
+            <a:pPr indent="-163195" lvl="1" marL="357187" rtl="0" algn="l">
+              <a:lnSpc>
+                <a:spcPct val="115000"/>
               </a:lnSpc>
               <a:spcBef>
                 <a:spcPts val="600"/>
@@ -35492,15 +35513,15 @@
               <a:buChar char="•"/>
             </a:pPr>
             <a:r>
-              <a:rPr lang="de-DE" sz="5600" u="sng"/>
+              <a:rPr lang="de-DE" sz="5200" u="sng"/>
               <a:t>BIC Netzwerk </a:t>
             </a:r>
-            <a:endParaRPr sz="5600"/>
+            <a:endParaRPr sz="5200"/>
           </a:p>
           <a:p>
             <a:pPr indent="0" lvl="1" marL="179387" rtl="0" algn="l">
               <a:lnSpc>
-                <a:spcPct val="100000"/>
+                <a:spcPct val="115000"/>
               </a:lnSpc>
               <a:spcBef>
                 <a:spcPts val="600"/>
@@ -35508,18 +35529,18 @@
               <a:spcAft>
                 <a:spcPts val="0"/>
               </a:spcAft>
-              <a:buSzPct val="32142"/>
+              <a:buSzPct val="34615"/>
               <a:buNone/>
             </a:pPr>
             <a:r>
               <a:t/>
             </a:r>
-            <a:endParaRPr sz="5600"/>
+            <a:endParaRPr sz="5200"/>
           </a:p>
           <a:p>
             <a:pPr indent="0" lvl="0" marL="0" rtl="0" algn="l">
               <a:lnSpc>
-                <a:spcPct val="100000"/>
+                <a:spcPct val="115000"/>
               </a:lnSpc>
               <a:spcBef>
                 <a:spcPts val="600"/>
@@ -35527,19 +35548,19 @@
               <a:spcAft>
                 <a:spcPts val="0"/>
               </a:spcAft>
-              <a:buSzPct val="32142"/>
+              <a:buSzPct val="34615"/>
               <a:buNone/>
             </a:pPr>
             <a:r>
-              <a:rPr b="1" lang="de-DE" sz="5600"/>
+              <a:rPr b="1" lang="de-DE" sz="5200"/>
               <a:t>Ressorteigene Kompetenzen / Teams aufbauen</a:t>
             </a:r>
-            <a:endParaRPr sz="5600"/>
+            <a:endParaRPr sz="5200"/>
           </a:p>
           <a:p>
-            <a:pPr indent="-169545" lvl="1" marL="357187" rtl="0" algn="l">
-              <a:lnSpc>
-                <a:spcPct val="100000"/>
+            <a:pPr indent="-163195" lvl="1" marL="357187" rtl="0" algn="l">
+              <a:lnSpc>
+                <a:spcPct val="115000"/>
               </a:lnSpc>
               <a:spcBef>
                 <a:spcPts val="600"/>
@@ -35551,15 +35572,15 @@
               <a:buChar char="•"/>
             </a:pPr>
             <a:r>
-              <a:rPr lang="de-DE" sz="5600"/>
+              <a:rPr lang="de-DE" sz="5200"/>
               <a:t>Leitfäden und Kontakte für schrittweisen Aufbau</a:t>
             </a:r>
-            <a:endParaRPr sz="5600"/>
+            <a:endParaRPr sz="5200"/>
           </a:p>
           <a:p>
-            <a:pPr indent="-169545" lvl="1" marL="357187" rtl="0" algn="l">
-              <a:lnSpc>
-                <a:spcPct val="100000"/>
+            <a:pPr indent="-163195" lvl="1" marL="357187" rtl="0" algn="l">
+              <a:lnSpc>
+                <a:spcPct val="115000"/>
               </a:lnSpc>
               <a:spcBef>
                 <a:spcPts val="600"/>
@@ -35571,15 +35592,15 @@
               <a:buChar char="•"/>
             </a:pPr>
             <a:r>
-              <a:rPr lang="de-DE" sz="5600"/>
+              <a:rPr lang="de-DE" sz="5200"/>
               <a:t>Unterstützung beim Erstellung von Stellenprofilen</a:t>
             </a:r>
-            <a:endParaRPr sz="5600"/>
+            <a:endParaRPr sz="5200"/>
           </a:p>
           <a:p>
-            <a:pPr indent="-169545" lvl="1" marL="357187" rtl="0" algn="l">
-              <a:lnSpc>
-                <a:spcPct val="100000"/>
+            <a:pPr indent="-163195" lvl="1" marL="357187" rtl="0" algn="l">
+              <a:lnSpc>
+                <a:spcPct val="115000"/>
               </a:lnSpc>
               <a:spcBef>
                 <a:spcPts val="600"/>
@@ -35591,10 +35612,10 @@
               <a:buChar char="•"/>
             </a:pPr>
             <a:r>
-              <a:rPr lang="de-DE" sz="5600"/>
+              <a:rPr lang="de-DE" sz="5200"/>
               <a:t>Vernetzung und Austausch</a:t>
             </a:r>
-            <a:endParaRPr sz="5600"/>
+            <a:endParaRPr sz="5200"/>
           </a:p>
           <a:p>
             <a:pPr indent="-80645" lvl="1" marL="357187" rtl="0" algn="l">
@@ -35787,60 +35808,6 @@
         <p:nvSpPr>
           <p:cNvPr id="364" name="Google Shape;364;g3bed6fea1e1_0_146"/>
           <p:cNvSpPr txBox="1"/>
-          <p:nvPr>
-            <p:ph idx="3" type="body"/>
-          </p:nvPr>
-        </p:nvSpPr>
-        <p:spPr>
-          <a:xfrm>
-            <a:off x="10281009" y="451942"/>
-            <a:ext cx="1698300" cy="712200"/>
-          </a:xfrm>
-          <a:prstGeom prst="rect">
-            <a:avLst/>
-          </a:prstGeom>
-          <a:blipFill rotWithShape="1">
-            <a:blip r:embed="rId3">
-              <a:alphaModFix/>
-            </a:blip>
-            <a:stretch>
-              <a:fillRect b="0" l="0" r="0" t="0"/>
-            </a:stretch>
-          </a:blipFill>
-          <a:ln>
-            <a:noFill/>
-          </a:ln>
-        </p:spPr>
-        <p:txBody>
-          <a:bodyPr anchorCtr="0" anchor="t" bIns="0" lIns="0" spcFirstLastPara="1" rIns="0" wrap="square" tIns="0">
-            <a:normAutofit/>
-          </a:bodyPr>
-          <a:lstStyle/>
-          <a:p>
-            <a:pPr indent="0" lvl="0" marL="0" rtl="0" algn="l">
-              <a:lnSpc>
-                <a:spcPct val="100000"/>
-              </a:lnSpc>
-              <a:spcBef>
-                <a:spcPts val="0"/>
-              </a:spcBef>
-              <a:spcAft>
-                <a:spcPts val="0"/>
-              </a:spcAft>
-              <a:buSzPts val="1800"/>
-              <a:buNone/>
-            </a:pPr>
-            <a:r>
-              <a:t/>
-            </a:r>
-            <a:endParaRPr/>
-          </a:p>
-        </p:txBody>
-      </p:sp>
-      <p:sp>
-        <p:nvSpPr>
-          <p:cNvPr id="365" name="Google Shape;365;g3bed6fea1e1_0_146"/>
-          <p:cNvSpPr txBox="1"/>
           <p:nvPr/>
         </p:nvSpPr>
         <p:spPr>
@@ -35876,12 +35843,40 @@
                 <a:solidFill>
                   <a:schemeClr val="lt1"/>
                 </a:solidFill>
+              </a:rPr>
+              <a:t>BMDS, </a:t>
+            </a:r>
+            <a:r>
+              <a:rPr b="1" lang="de-DE" sz="1800">
+                <a:solidFill>
+                  <a:schemeClr val="lt1"/>
+                </a:solidFill>
                 <a:latin typeface="Arial"/>
                 <a:ea typeface="Arial"/>
                 <a:cs typeface="Arial"/>
                 <a:sym typeface="Arial"/>
               </a:rPr>
-              <a:t>Referat 612 </a:t>
+              <a:t>Referat </a:t>
+            </a:r>
+            <a:r>
+              <a:rPr b="1" lang="de-DE" sz="1800">
+                <a:solidFill>
+                  <a:schemeClr val="lt1"/>
+                </a:solidFill>
+              </a:rPr>
+              <a:t>SB II 4</a:t>
+            </a:r>
+            <a:r>
+              <a:rPr b="1" lang="de-DE" sz="1800">
+                <a:solidFill>
+                  <a:schemeClr val="lt1"/>
+                </a:solidFill>
+                <a:latin typeface="Arial"/>
+                <a:ea typeface="Arial"/>
+                <a:cs typeface="Arial"/>
+                <a:sym typeface="Arial"/>
+              </a:rPr>
+              <a:t> </a:t>
             </a:r>
             <a:endParaRPr/>
           </a:p>
@@ -35980,7 +35975,7 @@
       </p:sp>
       <p:sp>
         <p:nvSpPr>
-          <p:cNvPr id="366" name="Google Shape;366;g3bed6fea1e1_0_146"/>
+          <p:cNvPr id="365" name="Google Shape;365;g3bed6fea1e1_0_146"/>
           <p:cNvSpPr txBox="1"/>
           <p:nvPr/>
         </p:nvSpPr>
@@ -36017,12 +36012,8 @@
                 <a:solidFill>
                   <a:schemeClr val="lt1"/>
                 </a:solidFill>
-                <a:latin typeface="Arial"/>
-                <a:ea typeface="Arial"/>
-                <a:cs typeface="Arial"/>
-                <a:sym typeface="Arial"/>
               </a:rPr>
-              <a:t>wirksam.regieren@bk.bund.de</a:t>
+              <a:t>SBII4@bmds.bund.de</a:t>
             </a:r>
             <a:endParaRPr/>
           </a:p>
@@ -36030,7 +36021,7 @@
       </p:sp>
       <p:sp>
         <p:nvSpPr>
-          <p:cNvPr id="367" name="Google Shape;367;g3bed6fea1e1_0_146"/>
+          <p:cNvPr id="366" name="Google Shape;366;g3bed6fea1e1_0_146"/>
           <p:cNvSpPr/>
           <p:nvPr/>
         </p:nvSpPr>

</xml_diff>